<commit_message>
Updated Spring Security .pptx
</commit_message>
<xml_diff>
--- a/assets/SpringSecurity.pptx
+++ b/assets/SpringSecurity.pptx
@@ -317,6 +317,11 @@
       </a:defRPr>
     </a:lvl9pPr>
   </p:defaultTextStyle>
+  <p:extLst>
+    <p:ext uri="{EFAFB233-063F-42B5-8137-9DF3F51BA10A}">
+      <p15:sldGuideLst xmlns:p15="http://schemas.microsoft.com/office/powerpoint/2012/main"/>
+    </p:ext>
+  </p:extLst>
 </p:presentation>
 </file>
 
@@ -6515,7 +6520,9 @@
           </a:prstGeom>
         </p:spPr>
         <p:txBody>
-          <a:bodyPr/>
+          <a:bodyPr>
+            <a:noAutofit/>
+          </a:bodyPr>
           <a:lstStyle/>
           <a:p>
             <a:pPr marL="597701" indent="-459398" algn="just" defTabSz="452627">
@@ -6537,26 +6544,81 @@
               </a:defRPr>
             </a:pPr>
             <a:r>
-              <a:rPr sz="1881" dirty="0" err="1">
-                <a:solidFill>
-                  <a:srgbClr val="FFFFFF"/>
-                </a:solidFill>
-                <a:latin typeface="Arial"/>
-                <a:cs typeface="Arial"/>
+              <a:rPr sz="2000" dirty="0" err="1">
+                <a:solidFill>
+                  <a:schemeClr val="tx1"/>
+                </a:solidFill>
+                <a:latin typeface="Avenir Next" panose="020B0503020202020204" pitchFamily="34" charset="0"/>
                 <a:sym typeface="Courier"/>
               </a:rPr>
               <a:t>ChannelProcessingFilter</a:t>
             </a:r>
             <a:r>
-              <a:rPr sz="1881" dirty="0">
-                <a:solidFill>
-                  <a:srgbClr val="FFFFFF"/>
-                </a:solidFill>
-                <a:latin typeface="Arial"/>
-                <a:cs typeface="Arial"/>
+              <a:rPr sz="2000" dirty="0">
+                <a:solidFill>
+                  <a:schemeClr val="tx1"/>
+                </a:solidFill>
+                <a:latin typeface="Avenir Next" panose="020B0503020202020204" pitchFamily="34" charset="0"/>
               </a:rPr>
-              <a:t>, because it might need to redirect to a different protocol</a:t>
-            </a:r>
+              <a:t>, </a:t>
+            </a:r>
+            <a:r>
+              <a:rPr lang="uk-UA" sz="2000" dirty="0">
+                <a:solidFill>
+                  <a:schemeClr val="tx1"/>
+                </a:solidFill>
+              </a:rPr>
+              <a:t>для можливого переходу на інший протокол</a:t>
+            </a:r>
+            <a:r>
+              <a:rPr lang="en-US" sz="2000" dirty="0">
+                <a:solidFill>
+                  <a:schemeClr val="tx1"/>
+                </a:solidFill>
+                <a:latin typeface="Avenir Next" panose="020B0503020202020204" pitchFamily="34" charset="0"/>
+              </a:rPr>
+              <a:t> (</a:t>
+            </a:r>
+            <a:r>
+              <a:rPr lang="uk-UA" sz="2000" dirty="0">
+                <a:solidFill>
+                  <a:schemeClr val="tx1"/>
+                </a:solidFill>
+              </a:rPr>
+              <a:t>наприклад </a:t>
+            </a:r>
+            <a:r>
+              <a:rPr lang="en-US" sz="2000" dirty="0">
+                <a:solidFill>
+                  <a:schemeClr val="tx1"/>
+                </a:solidFill>
+                <a:latin typeface="Avenir Next" panose="020B0503020202020204" pitchFamily="34" charset="0"/>
+              </a:rPr>
+              <a:t>https </a:t>
+            </a:r>
+            <a:r>
+              <a:rPr lang="uk-UA" sz="2000" dirty="0">
+                <a:solidFill>
+                  <a:schemeClr val="tx1"/>
+                </a:solidFill>
+              </a:rPr>
+              <a:t>для захисту</a:t>
+            </a:r>
+            <a:r>
+              <a:rPr lang="en-US" sz="2000" dirty="0">
+                <a:solidFill>
+                  <a:schemeClr val="tx1"/>
+                </a:solidFill>
+                <a:latin typeface="Avenir Next" panose="020B0503020202020204" pitchFamily="34" charset="0"/>
+              </a:rPr>
+              <a:t>)</a:t>
+            </a:r>
+            <a:endParaRPr sz="2000" dirty="0">
+              <a:solidFill>
+                <a:schemeClr val="tx1"/>
+              </a:solidFill>
+              <a:latin typeface="Avenir Next" panose="020B0503020202020204" pitchFamily="34" charset="0"/>
+            </a:endParaRPr>
           </a:p>
           <a:p>
             <a:pPr marL="597701" indent="-459398" algn="just" defTabSz="452627">
@@ -6578,110 +6640,64 @@
               </a:defRPr>
             </a:pPr>
             <a:r>
-              <a:rPr sz="1881" dirty="0" err="1">
-                <a:solidFill>
-                  <a:srgbClr val="FFFFFF"/>
-                </a:solidFill>
-                <a:latin typeface="Arial"/>
-                <a:cs typeface="Arial"/>
+              <a:rPr sz="2000" dirty="0" err="1">
+                <a:solidFill>
+                  <a:schemeClr val="tx1"/>
+                </a:solidFill>
+                <a:latin typeface="Avenir Next" panose="020B0503020202020204" pitchFamily="34" charset="0"/>
                 <a:sym typeface="Courier"/>
               </a:rPr>
               <a:t>SecurityContextPersistenceFilter</a:t>
             </a:r>
             <a:r>
-              <a:rPr sz="1881" dirty="0">
-                <a:solidFill>
-                  <a:srgbClr val="FFFFFF"/>
-                </a:solidFill>
-                <a:latin typeface="Arial"/>
-                <a:cs typeface="Arial"/>
+              <a:rPr sz="2000" dirty="0">
+                <a:solidFill>
+                  <a:schemeClr val="tx1"/>
+                </a:solidFill>
+                <a:latin typeface="Avenir Next" panose="020B0503020202020204" pitchFamily="34" charset="0"/>
               </a:rPr>
-              <a:t>, so a </a:t>
-            </a:r>
-            <a:r>
-              <a:rPr sz="1881" dirty="0" err="1">
-                <a:solidFill>
-                  <a:srgbClr val="FFFFFF"/>
-                </a:solidFill>
-                <a:latin typeface="Arial"/>
-                <a:cs typeface="Arial"/>
-                <a:sym typeface="Courier"/>
+              <a:t>, </a:t>
+            </a:r>
+            <a:r>
+              <a:rPr lang="uk-UA" sz="2000" dirty="0">
+                <a:solidFill>
+                  <a:schemeClr val="tx1"/>
+                </a:solidFill>
+              </a:rPr>
+              <a:t>для створення </a:t>
+            </a:r>
+            <a:r>
+              <a:rPr lang="en-US" sz="2000" dirty="0" err="1">
+                <a:solidFill>
+                  <a:schemeClr val="tx1"/>
+                </a:solidFill>
+                <a:latin typeface="Avenir Next" panose="020B0503020202020204" pitchFamily="34" charset="0"/>
               </a:rPr>
               <a:t>SecurityContext</a:t>
             </a:r>
             <a:r>
-              <a:rPr sz="1881" dirty="0">
-                <a:solidFill>
-                  <a:srgbClr val="FFFFFF"/>
-                </a:solidFill>
-                <a:latin typeface="Arial"/>
-                <a:cs typeface="Arial"/>
+              <a:rPr lang="en-US" sz="2000" dirty="0">
+                <a:solidFill>
+                  <a:schemeClr val="tx1"/>
+                </a:solidFill>
+                <a:latin typeface="Avenir Next" panose="020B0503020202020204" pitchFamily="34" charset="0"/>
               </a:rPr>
-              <a:t> can be set up in the </a:t>
-            </a:r>
-            <a:r>
-              <a:rPr sz="1881" dirty="0" err="1">
-                <a:solidFill>
-                  <a:srgbClr val="FFFFFF"/>
-                </a:solidFill>
-                <a:latin typeface="Arial"/>
-                <a:cs typeface="Arial"/>
-                <a:sym typeface="Courier"/>
+              <a:t>-y </a:t>
+            </a:r>
+            <a:r>
+              <a:rPr lang="uk-UA" sz="2000" dirty="0">
+                <a:solidFill>
+                  <a:schemeClr val="tx1"/>
+                </a:solidFill>
               </a:rPr>
-              <a:t>SecurityContextHolder</a:t>
-            </a:r>
-            <a:r>
-              <a:rPr sz="1881" dirty="0">
-                <a:solidFill>
-                  <a:srgbClr val="FFFFFF"/>
-                </a:solidFill>
-                <a:latin typeface="Arial"/>
-                <a:cs typeface="Arial"/>
-              </a:rPr>
-              <a:t> at the beginning of a web request, and any changes to the </a:t>
-            </a:r>
-            <a:r>
-              <a:rPr sz="1881" dirty="0" err="1">
-                <a:solidFill>
-                  <a:srgbClr val="FFFFFF"/>
-                </a:solidFill>
-                <a:latin typeface="Arial"/>
-                <a:cs typeface="Arial"/>
-                <a:sym typeface="Courier"/>
-              </a:rPr>
-              <a:t>SecurityContext</a:t>
-            </a:r>
-            <a:r>
-              <a:rPr sz="1881" dirty="0">
-                <a:solidFill>
-                  <a:srgbClr val="FFFFFF"/>
-                </a:solidFill>
-                <a:latin typeface="Arial"/>
-                <a:cs typeface="Arial"/>
-              </a:rPr>
-              <a:t> can be copied to the </a:t>
-            </a:r>
-            <a:r>
-              <a:rPr sz="1881" dirty="0" err="1">
-                <a:solidFill>
-                  <a:srgbClr val="FFFFFF"/>
-                </a:solidFill>
-                <a:latin typeface="Arial"/>
-                <a:cs typeface="Arial"/>
-                <a:sym typeface="Courier"/>
-              </a:rPr>
-              <a:t>HttpSession</a:t>
-            </a:r>
-            <a:r>
-              <a:rPr sz="1881" dirty="0">
-                <a:solidFill>
-                  <a:srgbClr val="FFFFFF"/>
-                </a:solidFill>
-                <a:latin typeface="Arial"/>
-                <a:cs typeface="Arial"/>
-              </a:rPr>
-              <a:t> when the web request ends (ready for use with the next web request)</a:t>
-            </a:r>
+              <a:t>з потенційним його використанням у майбутньому</a:t>
+            </a:r>
+            <a:endParaRPr sz="2000" dirty="0">
+              <a:solidFill>
+                <a:schemeClr val="tx1"/>
+              </a:solidFill>
+              <a:latin typeface="Avenir Next" panose="020B0503020202020204" pitchFamily="34" charset="0"/>
+            </a:endParaRPr>
           </a:p>
           <a:p>
             <a:pPr marL="597701" indent="-459398" algn="just" defTabSz="452627">
@@ -6703,68 +6719,64 @@
               </a:defRPr>
             </a:pPr>
             <a:r>
-              <a:rPr sz="1881" dirty="0" err="1">
-                <a:solidFill>
-                  <a:srgbClr val="FFFFFF"/>
-                </a:solidFill>
-                <a:latin typeface="Arial"/>
-                <a:cs typeface="Arial"/>
+              <a:rPr sz="2000" dirty="0" err="1">
+                <a:solidFill>
+                  <a:schemeClr val="tx1"/>
+                </a:solidFill>
+                <a:latin typeface="Avenir Next" panose="020B0503020202020204" pitchFamily="34" charset="0"/>
                 <a:sym typeface="Courier"/>
               </a:rPr>
               <a:t>ConcurrentSessionFilter</a:t>
             </a:r>
             <a:r>
-              <a:rPr sz="1881" dirty="0">
-                <a:solidFill>
-                  <a:srgbClr val="FFFFFF"/>
-                </a:solidFill>
-                <a:latin typeface="Arial"/>
-                <a:cs typeface="Arial"/>
+              <a:rPr sz="2000" dirty="0">
+                <a:solidFill>
+                  <a:schemeClr val="tx1"/>
+                </a:solidFill>
+                <a:latin typeface="Avenir Next" panose="020B0503020202020204" pitchFamily="34" charset="0"/>
               </a:rPr>
-              <a:t>, because it uses the </a:t>
-            </a:r>
-            <a:r>
-              <a:rPr sz="1881" dirty="0" err="1">
-                <a:solidFill>
-                  <a:srgbClr val="FFFFFF"/>
-                </a:solidFill>
-                <a:latin typeface="Arial"/>
-                <a:cs typeface="Arial"/>
-                <a:sym typeface="Courier"/>
+              <a:t>,</a:t>
+            </a:r>
+            <a:r>
+              <a:rPr lang="en-US" sz="2000" dirty="0">
+                <a:solidFill>
+                  <a:schemeClr val="tx1"/>
+                </a:solidFill>
+                <a:latin typeface="Avenir Next" panose="020B0503020202020204" pitchFamily="34" charset="0"/>
               </a:rPr>
-              <a:t>SecurityContextHolder</a:t>
-            </a:r>
-            <a:r>
-              <a:rPr sz="1881" dirty="0">
-                <a:solidFill>
-                  <a:srgbClr val="FFFFFF"/>
-                </a:solidFill>
-                <a:latin typeface="Arial"/>
-                <a:cs typeface="Arial"/>
+              <a:t> </a:t>
+            </a:r>
+            <a:r>
+              <a:rPr lang="uk-UA" sz="2000" dirty="0">
+                <a:solidFill>
+                  <a:schemeClr val="tx1"/>
+                </a:solidFill>
               </a:rPr>
-              <a:t> functionality but needs to update the </a:t>
-            </a:r>
-            <a:r>
-              <a:rPr sz="1881" dirty="0" err="1">
-                <a:solidFill>
-                  <a:srgbClr val="FFFFFF"/>
-                </a:solidFill>
-                <a:latin typeface="Arial"/>
-                <a:cs typeface="Arial"/>
-                <a:sym typeface="Courier"/>
+              <a:t>для оновлення</a:t>
+            </a:r>
+            <a:r>
+              <a:rPr lang="en-US" sz="2000" dirty="0">
+                <a:solidFill>
+                  <a:schemeClr val="tx1"/>
+                </a:solidFill>
+                <a:latin typeface="Avenir Next" panose="020B0503020202020204" pitchFamily="34" charset="0"/>
               </a:rPr>
-              <a:t>SessionRegistry</a:t>
-            </a:r>
-            <a:r>
-              <a:rPr sz="1881" dirty="0">
-                <a:solidFill>
-                  <a:srgbClr val="FFFFFF"/>
-                </a:solidFill>
-                <a:latin typeface="Arial"/>
-                <a:cs typeface="Arial"/>
+              <a:t> “last update” </a:t>
+            </a:r>
+            <a:r>
+              <a:rPr lang="uk-UA" sz="2000" dirty="0">
+                <a:solidFill>
+                  <a:schemeClr val="tx1"/>
+                </a:solidFill>
               </a:rPr>
-              <a:t> to reflect ongoing requests from the principality </a:t>
-            </a:r>
+              <a:t>часу в запиту і перевірки сесії на валідність (її час міг сплинути або її могли перервати передчасно)</a:t>
+            </a:r>
+            <a:endParaRPr sz="2000" dirty="0">
+              <a:solidFill>
+                <a:schemeClr val="tx1"/>
+              </a:solidFill>
+              <a:latin typeface="Avenir Next" panose="020B0503020202020204" pitchFamily="34" charset="0"/>
+            </a:endParaRPr>
           </a:p>
           <a:p>
             <a:pPr marL="597701" indent="-459398" algn="just" defTabSz="452627">
@@ -6786,140 +6798,163 @@
               </a:defRPr>
             </a:pPr>
             <a:r>
-              <a:rPr sz="1881" dirty="0">
-                <a:solidFill>
-                  <a:srgbClr val="FFFFFF"/>
-                </a:solidFill>
-                <a:latin typeface="Arial"/>
-                <a:cs typeface="Arial"/>
+              <a:rPr sz="2000" dirty="0">
+                <a:solidFill>
+                  <a:schemeClr val="tx1"/>
+                </a:solidFill>
+                <a:latin typeface="Avenir Next" panose="020B0503020202020204" pitchFamily="34" charset="0"/>
               </a:rPr>
               <a:t>Authentication processing mechanisms - </a:t>
             </a:r>
             <a:r>
-              <a:rPr sz="1881" dirty="0" err="1">
-                <a:solidFill>
-                  <a:srgbClr val="FFFFFF"/>
-                </a:solidFill>
-                <a:latin typeface="Arial"/>
-                <a:cs typeface="Arial"/>
+              <a:rPr sz="2000" dirty="0" err="1">
+                <a:solidFill>
+                  <a:schemeClr val="tx1"/>
+                </a:solidFill>
+                <a:latin typeface="Avenir Next" panose="020B0503020202020204" pitchFamily="34" charset="0"/>
                 <a:sym typeface="Courier"/>
               </a:rPr>
               <a:t>UsernamePasswordAuthenticationFilter</a:t>
             </a:r>
             <a:r>
-              <a:rPr sz="1881" dirty="0">
-                <a:solidFill>
-                  <a:srgbClr val="FFFFFF"/>
-                </a:solidFill>
-                <a:latin typeface="Arial"/>
-                <a:cs typeface="Arial"/>
+              <a:rPr sz="2000" dirty="0">
+                <a:solidFill>
+                  <a:schemeClr val="tx1"/>
+                </a:solidFill>
+                <a:latin typeface="Avenir Next" panose="020B0503020202020204" pitchFamily="34" charset="0"/>
               </a:rPr>
               <a:t>, </a:t>
             </a:r>
             <a:r>
-              <a:rPr sz="1881" dirty="0" err="1">
-                <a:solidFill>
-                  <a:srgbClr val="FFFFFF"/>
-                </a:solidFill>
-                <a:latin typeface="Arial"/>
-                <a:cs typeface="Arial"/>
+              <a:rPr sz="2000" dirty="0" err="1">
+                <a:solidFill>
+                  <a:schemeClr val="tx1"/>
+                </a:solidFill>
+                <a:latin typeface="Avenir Next" panose="020B0503020202020204" pitchFamily="34" charset="0"/>
                 <a:sym typeface="Courier"/>
               </a:rPr>
               <a:t>CasAuthenticationFilter</a:t>
             </a:r>
             <a:r>
-              <a:rPr sz="1881" dirty="0">
-                <a:solidFill>
-                  <a:srgbClr val="FFFFFF"/>
-                </a:solidFill>
-                <a:latin typeface="Arial"/>
-                <a:cs typeface="Arial"/>
+              <a:rPr sz="2000" dirty="0">
+                <a:solidFill>
+                  <a:schemeClr val="tx1"/>
+                </a:solidFill>
+                <a:latin typeface="Avenir Next" panose="020B0503020202020204" pitchFamily="34" charset="0"/>
               </a:rPr>
               <a:t>, </a:t>
             </a:r>
             <a:r>
-              <a:rPr sz="1881" dirty="0" err="1">
-                <a:solidFill>
-                  <a:srgbClr val="FFFFFF"/>
-                </a:solidFill>
-                <a:latin typeface="Arial"/>
-                <a:cs typeface="Arial"/>
+              <a:rPr sz="2000" dirty="0" err="1">
+                <a:solidFill>
+                  <a:schemeClr val="tx1"/>
+                </a:solidFill>
+                <a:latin typeface="Avenir Next" panose="020B0503020202020204" pitchFamily="34" charset="0"/>
                 <a:sym typeface="Courier"/>
               </a:rPr>
               <a:t>BasicAuthenticationFilter</a:t>
             </a:r>
             <a:r>
-              <a:rPr sz="1881" dirty="0">
-                <a:solidFill>
-                  <a:srgbClr val="FFFFFF"/>
-                </a:solidFill>
-                <a:latin typeface="Arial"/>
-                <a:cs typeface="Arial"/>
+              <a:rPr sz="2000" dirty="0">
+                <a:solidFill>
+                  <a:schemeClr val="tx1"/>
+                </a:solidFill>
+                <a:latin typeface="Avenir Next" panose="020B0503020202020204" pitchFamily="34" charset="0"/>
               </a:rPr>
               <a:t> </a:t>
             </a:r>
             <a:r>
-              <a:rPr sz="1881" dirty="0" err="1">
-                <a:solidFill>
-                  <a:srgbClr val="FFFFFF"/>
-                </a:solidFill>
-                <a:latin typeface="Arial"/>
-                <a:cs typeface="Arial"/>
+              <a:rPr sz="2000" dirty="0" err="1">
+                <a:solidFill>
+                  <a:schemeClr val="tx1"/>
+                </a:solidFill>
+                <a:latin typeface="Avenir Next" panose="020B0503020202020204" pitchFamily="34" charset="0"/>
               </a:rPr>
               <a:t>etc</a:t>
             </a:r>
             <a:r>
-              <a:rPr sz="1881" dirty="0">
-                <a:solidFill>
-                  <a:srgbClr val="FFFFFF"/>
-                </a:solidFill>
-                <a:latin typeface="Arial"/>
-                <a:cs typeface="Arial"/>
+              <a:rPr sz="2000" dirty="0">
+                <a:solidFill>
+                  <a:schemeClr val="tx1"/>
+                </a:solidFill>
+                <a:latin typeface="Avenir Next" panose="020B0503020202020204" pitchFamily="34" charset="0"/>
               </a:rPr>
-              <a:t> - so that the </a:t>
-            </a:r>
-            <a:r>
-              <a:rPr sz="1881" dirty="0" err="1">
-                <a:solidFill>
-                  <a:srgbClr val="FFFFFF"/>
-                </a:solidFill>
-                <a:latin typeface="Arial"/>
-                <a:cs typeface="Arial"/>
-                <a:sym typeface="Courier"/>
+              <a:t> </a:t>
+            </a:r>
+            <a:r>
+              <a:rPr lang="en-US" sz="2000" dirty="0">
+                <a:solidFill>
+                  <a:schemeClr val="tx1"/>
+                </a:solidFill>
+                <a:latin typeface="Avenir Next" panose="020B0503020202020204" pitchFamily="34" charset="0"/>
               </a:rPr>
-              <a:t>SecurityContextHolder</a:t>
-            </a:r>
-            <a:r>
-              <a:rPr sz="1881" dirty="0">
-                <a:solidFill>
-                  <a:srgbClr val="FFFFFF"/>
-                </a:solidFill>
-                <a:latin typeface="Arial"/>
-                <a:cs typeface="Arial"/>
+              <a:t>–</a:t>
+            </a:r>
+            <a:r>
+              <a:rPr sz="2000" dirty="0">
+                <a:solidFill>
+                  <a:schemeClr val="tx1"/>
+                </a:solidFill>
+                <a:latin typeface="Avenir Next" panose="020B0503020202020204" pitchFamily="34" charset="0"/>
               </a:rPr>
-              <a:t> can be modified to contain a valid </a:t>
-            </a:r>
-            <a:r>
-              <a:rPr sz="1881" dirty="0">
-                <a:solidFill>
-                  <a:srgbClr val="FFFFFF"/>
-                </a:solidFill>
-                <a:latin typeface="Arial"/>
-                <a:cs typeface="Arial"/>
-                <a:sym typeface="Courier"/>
+              <a:t> </a:t>
+            </a:r>
+            <a:r>
+              <a:rPr lang="uk-UA" sz="2000" dirty="0">
+                <a:solidFill>
+                  <a:schemeClr val="tx1"/>
+                </a:solidFill>
               </a:rPr>
-              <a:t>Authentication</a:t>
-            </a:r>
-            <a:r>
-              <a:rPr sz="1881" dirty="0">
-                <a:solidFill>
-                  <a:srgbClr val="FFFFFF"/>
-                </a:solidFill>
-                <a:latin typeface="Arial"/>
-                <a:cs typeface="Arial"/>
+              <a:t>для забезпечення </a:t>
+            </a:r>
+            <a:r>
+              <a:rPr lang="en-US" sz="2000" dirty="0" err="1">
+                <a:solidFill>
+                  <a:schemeClr val="tx1"/>
+                </a:solidFill>
+                <a:latin typeface="Avenir Next" panose="020B0503020202020204" pitchFamily="34" charset="0"/>
               </a:rPr>
-              <a:t> request token</a:t>
-            </a:r>
+              <a:t>SecurityContext</a:t>
+            </a:r>
+            <a:r>
+              <a:rPr lang="en-US" sz="2000" dirty="0">
+                <a:solidFill>
+                  <a:schemeClr val="tx1"/>
+                </a:solidFill>
+                <a:latin typeface="Avenir Next" panose="020B0503020202020204" pitchFamily="34" charset="0"/>
+              </a:rPr>
+              <a:t>-</a:t>
+            </a:r>
+            <a:r>
+              <a:rPr lang="uk-UA" sz="2000" dirty="0">
+                <a:solidFill>
+                  <a:schemeClr val="tx1"/>
+                </a:solidFill>
+              </a:rPr>
+              <a:t>а правильним </a:t>
+            </a:r>
+            <a:r>
+              <a:rPr lang="uk-UA" sz="2000" dirty="0" err="1">
+                <a:solidFill>
+                  <a:schemeClr val="tx1"/>
+                </a:solidFill>
+              </a:rPr>
+              <a:t>токеном</a:t>
+            </a:r>
+            <a:r>
+              <a:rPr lang="uk-UA" sz="2000" dirty="0">
+                <a:solidFill>
+                  <a:schemeClr val="tx1"/>
+                </a:solidFill>
+              </a:rPr>
+              <a:t> авторизації</a:t>
+            </a:r>
+            <a:endParaRPr sz="2000" dirty="0">
+              <a:solidFill>
+                <a:schemeClr val="tx1"/>
+              </a:solidFill>
+              <a:latin typeface="Avenir Next" panose="020B0503020202020204" pitchFamily="34" charset="0"/>
+            </a:endParaRPr>
           </a:p>
           <a:p>
             <a:pPr marL="597701" indent="-459398" algn="just" defTabSz="452627">
@@ -6941,57 +6976,105 @@
               </a:defRPr>
             </a:pPr>
             <a:r>
-              <a:rPr sz="1881" dirty="0">
-                <a:solidFill>
-                  <a:srgbClr val="FFFFFF"/>
-                </a:solidFill>
-                <a:latin typeface="Arial"/>
-                <a:cs typeface="Arial"/>
+              <a:rPr sz="2000" dirty="0">
+                <a:solidFill>
+                  <a:schemeClr val="tx1"/>
+                </a:solidFill>
+                <a:latin typeface="Avenir Next" panose="020B0503020202020204" pitchFamily="34" charset="0"/>
               </a:rPr>
               <a:t>The </a:t>
             </a:r>
             <a:r>
-              <a:rPr sz="1881" dirty="0" err="1">
-                <a:solidFill>
-                  <a:srgbClr val="FFFFFF"/>
-                </a:solidFill>
-                <a:latin typeface="Arial"/>
-                <a:cs typeface="Arial"/>
+              <a:rPr sz="2000" dirty="0" err="1">
+                <a:solidFill>
+                  <a:schemeClr val="tx1"/>
+                </a:solidFill>
+                <a:latin typeface="Avenir Next" panose="020B0503020202020204" pitchFamily="34" charset="0"/>
                 <a:sym typeface="Courier"/>
               </a:rPr>
               <a:t>SecurityContextHolderAwareRequestFilter</a:t>
             </a:r>
             <a:r>
-              <a:rPr sz="1881" dirty="0">
-                <a:solidFill>
-                  <a:srgbClr val="FFFFFF"/>
-                </a:solidFill>
-                <a:latin typeface="Arial"/>
-                <a:cs typeface="Arial"/>
+              <a:rPr sz="2000" dirty="0">
+                <a:solidFill>
+                  <a:schemeClr val="tx1"/>
+                </a:solidFill>
+                <a:latin typeface="Avenir Next" panose="020B0503020202020204" pitchFamily="34" charset="0"/>
               </a:rPr>
-              <a:t>, if you are using it to install a Spring Security aware </a:t>
-            </a:r>
-            <a:r>
-              <a:rPr sz="1881" dirty="0" err="1">
-                <a:solidFill>
-                  <a:srgbClr val="FFFFFF"/>
-                </a:solidFill>
-                <a:latin typeface="Arial"/>
-                <a:cs typeface="Arial"/>
-                <a:sym typeface="Courier"/>
+              <a:t>, </a:t>
+            </a:r>
+            <a:r>
+              <a:rPr lang="uk-UA" sz="2000" dirty="0">
+                <a:solidFill>
+                  <a:schemeClr val="tx1"/>
+                </a:solidFill>
+              </a:rPr>
+              <a:t>для створення </a:t>
+            </a:r>
+            <a:r>
+              <a:rPr lang="en-US" sz="2000" dirty="0" err="1">
+                <a:solidFill>
+                  <a:schemeClr val="tx1"/>
+                </a:solidFill>
+                <a:latin typeface="Avenir Next" panose="020B0503020202020204" pitchFamily="34" charset="0"/>
+                <a:sym typeface="Arial"/>
               </a:rPr>
               <a:t>HttpServletRequestWrapper</a:t>
             </a:r>
             <a:r>
-              <a:rPr sz="1881" dirty="0">
-                <a:solidFill>
-                  <a:srgbClr val="FFFFFF"/>
-                </a:solidFill>
-                <a:latin typeface="Arial"/>
-                <a:cs typeface="Arial"/>
+              <a:rPr lang="uk-UA" sz="2000" dirty="0">
+                <a:solidFill>
+                  <a:schemeClr val="tx1"/>
+                </a:solidFill>
+                <a:sym typeface="Arial"/>
               </a:rPr>
-              <a:t> into your servlet container</a:t>
-            </a:r>
+              <a:t> який знає про існування </a:t>
+            </a:r>
+            <a:r>
+              <a:rPr lang="en-US" sz="2000" dirty="0" err="1">
+                <a:solidFill>
+                  <a:schemeClr val="tx1"/>
+                </a:solidFill>
+                <a:latin typeface="Avenir Next" panose="020B0503020202020204" pitchFamily="34" charset="0"/>
+                <a:sym typeface="Arial"/>
+              </a:rPr>
+              <a:t>SecurityContext</a:t>
+            </a:r>
+            <a:r>
+              <a:rPr lang="en-US" sz="2000" dirty="0">
+                <a:solidFill>
+                  <a:schemeClr val="tx1"/>
+                </a:solidFill>
+                <a:latin typeface="Avenir Next" panose="020B0503020202020204" pitchFamily="34" charset="0"/>
+                <a:sym typeface="Arial"/>
+              </a:rPr>
+              <a:t>-</a:t>
+            </a:r>
+            <a:r>
+              <a:rPr lang="uk-UA" sz="2000" dirty="0">
+                <a:solidFill>
+                  <a:schemeClr val="tx1"/>
+                </a:solidFill>
+                <a:sym typeface="Arial"/>
+              </a:rPr>
+              <a:t>а (іншими словами – </a:t>
+            </a:r>
+            <a:r>
+              <a:rPr lang="en-US" sz="2000" dirty="0">
+                <a:solidFill>
+                  <a:schemeClr val="tx1"/>
+                </a:solidFill>
+                <a:latin typeface="Avenir Next" panose="020B0503020202020204" pitchFamily="34" charset="0"/>
+                <a:sym typeface="Arial"/>
+              </a:rPr>
+              <a:t>security context aware)</a:t>
+            </a:r>
+            <a:endParaRPr sz="2000" dirty="0">
+              <a:solidFill>
+                <a:schemeClr val="tx1"/>
+              </a:solidFill>
+              <a:latin typeface="Avenir Next" panose="020B0503020202020204" pitchFamily="34" charset="0"/>
+            </a:endParaRPr>
           </a:p>
           <a:p>
             <a:pPr marL="597701" indent="-459398" algn="just" defTabSz="452627">
@@ -7013,68 +7096,55 @@
               </a:defRPr>
             </a:pPr>
             <a:r>
-              <a:rPr sz="1881" dirty="0" err="1">
-                <a:solidFill>
-                  <a:srgbClr val="FFFFFF"/>
-                </a:solidFill>
-                <a:latin typeface="Arial"/>
-                <a:cs typeface="Arial"/>
+              <a:rPr sz="2000" dirty="0" err="1">
+                <a:solidFill>
+                  <a:schemeClr val="tx1"/>
+                </a:solidFill>
+                <a:latin typeface="Avenir Next" panose="020B0503020202020204" pitchFamily="34" charset="0"/>
                 <a:sym typeface="Courier"/>
               </a:rPr>
               <a:t>RememberMeAuthenticationFilter</a:t>
             </a:r>
             <a:r>
-              <a:rPr sz="1881" dirty="0">
-                <a:solidFill>
-                  <a:srgbClr val="FFFFFF"/>
-                </a:solidFill>
-                <a:latin typeface="Arial"/>
-                <a:cs typeface="Arial"/>
+              <a:rPr sz="2000" dirty="0">
+                <a:solidFill>
+                  <a:schemeClr val="tx1"/>
+                </a:solidFill>
+                <a:latin typeface="Avenir Next" panose="020B0503020202020204" pitchFamily="34" charset="0"/>
               </a:rPr>
-              <a:t>, so that if no earlier authentication processing mechanism updated the </a:t>
-            </a:r>
-            <a:r>
-              <a:rPr sz="1881" dirty="0" err="1">
-                <a:solidFill>
-                  <a:srgbClr val="FFFFFF"/>
-                </a:solidFill>
-                <a:latin typeface="Arial"/>
-                <a:cs typeface="Arial"/>
-                <a:sym typeface="Courier"/>
+              <a:t>, </a:t>
+            </a:r>
+            <a:r>
+              <a:rPr lang="uk-UA" sz="2000" dirty="0">
+                <a:solidFill>
+                  <a:schemeClr val="tx1"/>
+                </a:solidFill>
               </a:rPr>
-              <a:t>SecurityContextHolder</a:t>
-            </a:r>
-            <a:r>
-              <a:rPr sz="1881" dirty="0">
-                <a:solidFill>
-                  <a:srgbClr val="FFFFFF"/>
-                </a:solidFill>
-                <a:latin typeface="Arial"/>
-                <a:cs typeface="Arial"/>
+              <a:t>для увімкнення </a:t>
+            </a:r>
+            <a:r>
+              <a:rPr lang="en-US" sz="2000" dirty="0">
+                <a:solidFill>
+                  <a:schemeClr val="tx1"/>
+                </a:solidFill>
+                <a:latin typeface="Avenir Next" panose="020B0503020202020204" pitchFamily="34" charset="0"/>
               </a:rPr>
-              <a:t>, and the request presents a cookie that enables remember-me services to take place, a suitable remembered </a:t>
-            </a:r>
-            <a:r>
-              <a:rPr sz="1881" dirty="0">
-                <a:solidFill>
-                  <a:srgbClr val="FFFFFF"/>
-                </a:solidFill>
-                <a:latin typeface="Arial"/>
-                <a:cs typeface="Arial"/>
-                <a:sym typeface="Courier"/>
+              <a:t>Remember me </a:t>
+            </a:r>
+            <a:r>
+              <a:rPr lang="uk-UA" sz="2000" dirty="0">
+                <a:solidFill>
+                  <a:schemeClr val="tx1"/>
+                </a:solidFill>
               </a:rPr>
-              <a:t>Authentication</a:t>
-            </a:r>
-            <a:r>
-              <a:rPr sz="1881" dirty="0">
-                <a:solidFill>
-                  <a:srgbClr val="FFFFFF"/>
-                </a:solidFill>
-                <a:latin typeface="Arial"/>
-                <a:cs typeface="Arial"/>
-              </a:rPr>
-              <a:t> object will be put there</a:t>
-            </a:r>
+              <a:t>функціоналу, який дозволяє використовувати не лише сесію для авторизації</a:t>
+            </a:r>
+            <a:endParaRPr sz="2000" dirty="0">
+              <a:solidFill>
+                <a:schemeClr val="tx1"/>
+              </a:solidFill>
+              <a:latin typeface="Avenir Next" panose="020B0503020202020204" pitchFamily="34" charset="0"/>
+            </a:endParaRPr>
           </a:p>
           <a:p>
             <a:pPr marL="597701" indent="-459398" algn="just" defTabSz="452627">
@@ -7096,68 +7166,54 @@
               </a:defRPr>
             </a:pPr>
             <a:r>
-              <a:rPr sz="1881" dirty="0" err="1">
-                <a:solidFill>
-                  <a:srgbClr val="FFFFFF"/>
-                </a:solidFill>
-                <a:latin typeface="Arial"/>
-                <a:cs typeface="Arial"/>
+              <a:rPr sz="2000" dirty="0" err="1">
+                <a:solidFill>
+                  <a:schemeClr val="tx1"/>
+                </a:solidFill>
+                <a:latin typeface="Avenir Next" panose="020B0503020202020204" pitchFamily="34" charset="0"/>
                 <a:sym typeface="Courier"/>
               </a:rPr>
               <a:t>AnonymousAuthenticationFilter</a:t>
             </a:r>
             <a:r>
-              <a:rPr sz="1881" dirty="0">
-                <a:solidFill>
-                  <a:srgbClr val="FFFFFF"/>
-                </a:solidFill>
-                <a:latin typeface="Arial"/>
-                <a:cs typeface="Arial"/>
+              <a:rPr sz="2000" dirty="0">
+                <a:solidFill>
+                  <a:schemeClr val="tx1"/>
+                </a:solidFill>
+                <a:latin typeface="Avenir Next" panose="020B0503020202020204" pitchFamily="34" charset="0"/>
               </a:rPr>
-              <a:t>, so that if no earlier authentication processing mechanism updated the </a:t>
-            </a:r>
-            <a:r>
-              <a:rPr sz="1881" dirty="0" err="1">
-                <a:solidFill>
-                  <a:srgbClr val="FFFFFF"/>
-                </a:solidFill>
-                <a:latin typeface="Arial"/>
-                <a:cs typeface="Arial"/>
-                <a:sym typeface="Courier"/>
+              <a:t>, </a:t>
+            </a:r>
+            <a:r>
+              <a:rPr lang="uk-UA" sz="2000" dirty="0">
+                <a:solidFill>
+                  <a:schemeClr val="tx1"/>
+                </a:solidFill>
               </a:rPr>
-              <a:t>SecurityContextHolder</a:t>
-            </a:r>
-            <a:r>
-              <a:rPr sz="1881" dirty="0">
-                <a:solidFill>
-                  <a:srgbClr val="FFFFFF"/>
-                </a:solidFill>
-                <a:latin typeface="Arial"/>
-                <a:cs typeface="Arial"/>
+              <a:t>для авторизації користувача як анонімного, якщо жоден з попередніх фільтрів не надавав </a:t>
+            </a:r>
+            <a:r>
+              <a:rPr lang="uk-UA" sz="2000" dirty="0" err="1">
+                <a:solidFill>
+                  <a:schemeClr val="tx1"/>
+                </a:solidFill>
               </a:rPr>
-              <a:t>, an anonymous </a:t>
-            </a:r>
-            <a:r>
-              <a:rPr sz="1881" dirty="0">
-                <a:solidFill>
-                  <a:srgbClr val="FFFFFF"/>
-                </a:solidFill>
-                <a:latin typeface="Arial"/>
-                <a:cs typeface="Arial"/>
-                <a:sym typeface="Courier"/>
+              <a:t>авторизаційних</a:t>
+            </a:r>
+            <a:r>
+              <a:rPr lang="uk-UA" sz="2000" dirty="0">
+                <a:solidFill>
+                  <a:schemeClr val="tx1"/>
+                </a:solidFill>
               </a:rPr>
-              <a:t>Authentication</a:t>
-            </a:r>
-            <a:r>
-              <a:rPr sz="1881" dirty="0">
-                <a:solidFill>
-                  <a:srgbClr val="FFFFFF"/>
-                </a:solidFill>
-                <a:latin typeface="Arial"/>
-                <a:cs typeface="Arial"/>
-              </a:rPr>
-              <a:t> object will be put there</a:t>
-            </a:r>
+              <a:t> даних</a:t>
+            </a:r>
+            <a:endParaRPr sz="2000" dirty="0">
+              <a:solidFill>
+                <a:schemeClr val="tx1"/>
+              </a:solidFill>
+              <a:latin typeface="Avenir Next" panose="020B0503020202020204" pitchFamily="34" charset="0"/>
+            </a:endParaRPr>
           </a:p>
           <a:p>
             <a:pPr marL="597701" indent="-459398" algn="just" defTabSz="452627">
@@ -7179,47 +7235,55 @@
               </a:defRPr>
             </a:pPr>
             <a:r>
-              <a:rPr sz="1881" dirty="0" err="1">
-                <a:solidFill>
-                  <a:srgbClr val="FFFFFF"/>
-                </a:solidFill>
-                <a:latin typeface="Arial"/>
-                <a:cs typeface="Arial"/>
+              <a:rPr sz="2000" dirty="0" err="1">
+                <a:solidFill>
+                  <a:schemeClr val="tx1"/>
+                </a:solidFill>
+                <a:latin typeface="Avenir Next" panose="020B0503020202020204" pitchFamily="34" charset="0"/>
                 <a:sym typeface="Courier"/>
               </a:rPr>
               <a:t>ExceptionTranslationFilter</a:t>
             </a:r>
             <a:r>
-              <a:rPr sz="1881" dirty="0">
-                <a:solidFill>
-                  <a:srgbClr val="FFFFFF"/>
-                </a:solidFill>
-                <a:latin typeface="Arial"/>
-                <a:cs typeface="Arial"/>
+              <a:rPr sz="2000" dirty="0">
+                <a:solidFill>
+                  <a:schemeClr val="tx1"/>
+                </a:solidFill>
+                <a:latin typeface="Avenir Next" panose="020B0503020202020204" pitchFamily="34" charset="0"/>
               </a:rPr>
-              <a:t>, to catch any Spring Security exceptions so that either an HTTP error response can be returned or an appropriate </a:t>
-            </a:r>
-            <a:r>
-              <a:rPr sz="1881" dirty="0" err="1">
-                <a:solidFill>
-                  <a:srgbClr val="FFFFFF"/>
-                </a:solidFill>
-                <a:latin typeface="Arial"/>
-                <a:cs typeface="Arial"/>
-                <a:sym typeface="Courier"/>
+              <a:t>, </a:t>
+            </a:r>
+            <a:r>
+              <a:rPr lang="uk-UA" sz="2000" dirty="0">
+                <a:solidFill>
+                  <a:schemeClr val="tx1"/>
+                </a:solidFill>
               </a:rPr>
-              <a:t>AuthenticationEntryPoint</a:t>
-            </a:r>
-            <a:r>
-              <a:rPr sz="1881" dirty="0">
-                <a:solidFill>
-                  <a:srgbClr val="FFFFFF"/>
-                </a:solidFill>
-                <a:latin typeface="Arial"/>
-                <a:cs typeface="Arial"/>
+              <a:t>для перехоплення і опрацювання будь-яких помилок  пов’язаних з авторизацією та повернення правильного коду відповіді або виклику коректного обробника (</a:t>
+            </a:r>
+            <a:r>
+              <a:rPr lang="en-US" sz="2000" dirty="0">
+                <a:solidFill>
+                  <a:schemeClr val="tx1"/>
+                </a:solidFill>
+                <a:latin typeface="Avenir Next" panose="020B0503020202020204" pitchFamily="34" charset="0"/>
               </a:rPr>
-              <a:t> can be launched</a:t>
-            </a:r>
+              <a:t>authentication entry point – </a:t>
+            </a:r>
+            <a:r>
+              <a:rPr lang="uk-UA" sz="2000" dirty="0">
+                <a:solidFill>
+                  <a:schemeClr val="tx1"/>
+                </a:solidFill>
+              </a:rPr>
+              <a:t>сторінка авторизації)</a:t>
+            </a:r>
+            <a:endParaRPr sz="2000" dirty="0">
+              <a:solidFill>
+                <a:schemeClr val="tx1"/>
+              </a:solidFill>
+              <a:latin typeface="Avenir Next" panose="020B0503020202020204" pitchFamily="34" charset="0"/>
+            </a:endParaRPr>
           </a:p>
           <a:p>
             <a:pPr marL="597701" indent="-459398" algn="just" defTabSz="452627">
@@ -7241,26 +7305,38 @@
               </a:defRPr>
             </a:pPr>
             <a:r>
-              <a:rPr sz="1881" dirty="0" err="1">
-                <a:solidFill>
-                  <a:srgbClr val="FFFFFF"/>
-                </a:solidFill>
-                <a:latin typeface="Arial"/>
-                <a:cs typeface="Arial"/>
+              <a:rPr sz="2000" dirty="0" err="1">
+                <a:solidFill>
+                  <a:schemeClr val="tx1"/>
+                </a:solidFill>
+                <a:latin typeface="Avenir Next" panose="020B0503020202020204" pitchFamily="34" charset="0"/>
                 <a:sym typeface="Courier"/>
               </a:rPr>
               <a:t>FilterSecurityInterceptor</a:t>
             </a:r>
             <a:r>
-              <a:rPr sz="1881" dirty="0">
-                <a:solidFill>
-                  <a:srgbClr val="FFFFFF"/>
-                </a:solidFill>
-                <a:latin typeface="Arial"/>
-                <a:cs typeface="Arial"/>
+              <a:rPr sz="2000" dirty="0">
+                <a:solidFill>
+                  <a:schemeClr val="tx1"/>
+                </a:solidFill>
+                <a:latin typeface="Avenir Next" panose="020B0503020202020204" pitchFamily="34" charset="0"/>
               </a:rPr>
-              <a:t>, to protect web URIs and raise exceptions when access is denied</a:t>
-            </a:r>
+              <a:t>, </a:t>
+            </a:r>
+            <a:r>
+              <a:rPr lang="uk-UA" sz="2000" dirty="0">
+                <a:solidFill>
+                  <a:schemeClr val="tx1"/>
+                </a:solidFill>
+              </a:rPr>
+              <a:t>для захисту ресурсів від неавторизованого доступу</a:t>
+            </a:r>
+            <a:endParaRPr sz="2000" dirty="0">
+              <a:solidFill>
+                <a:schemeClr val="tx1"/>
+              </a:solidFill>
+              <a:latin typeface="Avenir Next" panose="020B0503020202020204" pitchFamily="34" charset="0"/>
+            </a:endParaRPr>
           </a:p>
         </p:txBody>
       </p:sp>

</xml_diff>